<commit_message>
speckle export working now
</commit_message>
<xml_diff>
--- a/docs/functions.pptx
+++ b/docs/functions.pptx
@@ -6,6 +6,7 @@
   </p:sldMasterIdLst>
   <p:sldIdLst>
     <p:sldId id="256" r:id="rId2"/>
+    <p:sldId id="257" r:id="rId3"/>
   </p:sldIdLst>
   <p:sldSz cx="12192000" cy="6858000"/>
   <p:notesSz cx="6858000" cy="9144000"/>
@@ -104,6 +105,11 @@
       </a:defRPr>
     </a:lvl9pPr>
   </p:defaultTextStyle>
+  <p:extLst>
+    <p:ext uri="{EFAFB233-063F-42B5-8137-9DF3F51BA10A}">
+      <p15:sldGuideLst xmlns:p15="http://schemas.microsoft.com/office/powerpoint/2012/main"/>
+    </p:ext>
+  </p:extLst>
 </p:presentation>
 </file>
 
@@ -256,7 +262,7 @@
           <a:p>
             <a:fld id="{7BE618FE-686D-4E7D-BDA2-690D38C5FF0A}" type="datetimeFigureOut">
               <a:rPr lang="en-NL" smtClean="0"/>
-              <a:t>29/01/2025</a:t>
+              <a:t>03/05/2025</a:t>
             </a:fld>
             <a:endParaRPr lang="en-NL"/>
           </a:p>
@@ -456,7 +462,7 @@
           <a:p>
             <a:fld id="{7BE618FE-686D-4E7D-BDA2-690D38C5FF0A}" type="datetimeFigureOut">
               <a:rPr lang="en-NL" smtClean="0"/>
-              <a:t>29/01/2025</a:t>
+              <a:t>03/05/2025</a:t>
             </a:fld>
             <a:endParaRPr lang="en-NL"/>
           </a:p>
@@ -666,7 +672,7 @@
           <a:p>
             <a:fld id="{7BE618FE-686D-4E7D-BDA2-690D38C5FF0A}" type="datetimeFigureOut">
               <a:rPr lang="en-NL" smtClean="0"/>
-              <a:t>29/01/2025</a:t>
+              <a:t>03/05/2025</a:t>
             </a:fld>
             <a:endParaRPr lang="en-NL"/>
           </a:p>
@@ -866,7 +872,7 @@
           <a:p>
             <a:fld id="{7BE618FE-686D-4E7D-BDA2-690D38C5FF0A}" type="datetimeFigureOut">
               <a:rPr lang="en-NL" smtClean="0"/>
-              <a:t>29/01/2025</a:t>
+              <a:t>03/05/2025</a:t>
             </a:fld>
             <a:endParaRPr lang="en-NL"/>
           </a:p>
@@ -1142,7 +1148,7 @@
           <a:p>
             <a:fld id="{7BE618FE-686D-4E7D-BDA2-690D38C5FF0A}" type="datetimeFigureOut">
               <a:rPr lang="en-NL" smtClean="0"/>
-              <a:t>29/01/2025</a:t>
+              <a:t>03/05/2025</a:t>
             </a:fld>
             <a:endParaRPr lang="en-NL"/>
           </a:p>
@@ -1410,7 +1416,7 @@
           <a:p>
             <a:fld id="{7BE618FE-686D-4E7D-BDA2-690D38C5FF0A}" type="datetimeFigureOut">
               <a:rPr lang="en-NL" smtClean="0"/>
-              <a:t>29/01/2025</a:t>
+              <a:t>03/05/2025</a:t>
             </a:fld>
             <a:endParaRPr lang="en-NL"/>
           </a:p>
@@ -1825,7 +1831,7 @@
           <a:p>
             <a:fld id="{7BE618FE-686D-4E7D-BDA2-690D38C5FF0A}" type="datetimeFigureOut">
               <a:rPr lang="en-NL" smtClean="0"/>
-              <a:t>29/01/2025</a:t>
+              <a:t>03/05/2025</a:t>
             </a:fld>
             <a:endParaRPr lang="en-NL"/>
           </a:p>
@@ -1967,7 +1973,7 @@
           <a:p>
             <a:fld id="{7BE618FE-686D-4E7D-BDA2-690D38C5FF0A}" type="datetimeFigureOut">
               <a:rPr lang="en-NL" smtClean="0"/>
-              <a:t>29/01/2025</a:t>
+              <a:t>03/05/2025</a:t>
             </a:fld>
             <a:endParaRPr lang="en-NL"/>
           </a:p>
@@ -2080,7 +2086,7 @@
           <a:p>
             <a:fld id="{7BE618FE-686D-4E7D-BDA2-690D38C5FF0A}" type="datetimeFigureOut">
               <a:rPr lang="en-NL" smtClean="0"/>
-              <a:t>29/01/2025</a:t>
+              <a:t>03/05/2025</a:t>
             </a:fld>
             <a:endParaRPr lang="en-NL"/>
           </a:p>
@@ -2393,7 +2399,7 @@
           <a:p>
             <a:fld id="{7BE618FE-686D-4E7D-BDA2-690D38C5FF0A}" type="datetimeFigureOut">
               <a:rPr lang="en-NL" smtClean="0"/>
-              <a:t>29/01/2025</a:t>
+              <a:t>03/05/2025</a:t>
             </a:fld>
             <a:endParaRPr lang="en-NL"/>
           </a:p>
@@ -2682,7 +2688,7 @@
           <a:p>
             <a:fld id="{7BE618FE-686D-4E7D-BDA2-690D38C5FF0A}" type="datetimeFigureOut">
               <a:rPr lang="en-NL" smtClean="0"/>
-              <a:t>29/01/2025</a:t>
+              <a:t>03/05/2025</a:t>
             </a:fld>
             <a:endParaRPr lang="en-NL"/>
           </a:p>
@@ -2925,7 +2931,7 @@
           <a:p>
             <a:fld id="{7BE618FE-686D-4E7D-BDA2-690D38C5FF0A}" type="datetimeFigureOut">
               <a:rPr lang="en-NL" smtClean="0"/>
-              <a:t>29/01/2025</a:t>
+              <a:t>03/05/2025</a:t>
             </a:fld>
             <a:endParaRPr lang="en-NL"/>
           </a:p>
@@ -3920,6 +3926,431 @@
     <p:extLst>
       <p:ext uri="{BB962C8B-B14F-4D97-AF65-F5344CB8AC3E}">
         <p14:creationId xmlns:p14="http://schemas.microsoft.com/office/powerpoint/2010/main" val="2396143701"/>
+      </p:ext>
+    </p:extLst>
+  </p:cSld>
+  <p:clrMapOvr>
+    <a:masterClrMapping/>
+  </p:clrMapOvr>
+</p:sld>
+</file>
+
+<file path=ppt/slides/slide2.xml><?xml version="1.0" encoding="utf-8"?>
+<p:sld xmlns:a="http://schemas.openxmlformats.org/drawingml/2006/main" xmlns:r="http://schemas.openxmlformats.org/officeDocument/2006/relationships" xmlns:p="http://schemas.openxmlformats.org/presentationml/2006/main">
+  <p:cSld>
+    <p:spTree>
+      <p:nvGrpSpPr>
+        <p:cNvPr id="1" name="">
+          <a:extLst>
+            <a:ext uri="{FF2B5EF4-FFF2-40B4-BE49-F238E27FC236}">
+              <a16:creationId xmlns:a16="http://schemas.microsoft.com/office/drawing/2014/main" id="{A0BD2F6E-7A8F-37E8-395D-BAA1C57D0549}"/>
+            </a:ext>
+          </a:extLst>
+        </p:cNvPr>
+        <p:cNvGrpSpPr/>
+        <p:nvPr/>
+      </p:nvGrpSpPr>
+      <p:grpSpPr>
+        <a:xfrm>
+          <a:off x="0" y="0"/>
+          <a:ext cx="0" cy="0"/>
+          <a:chOff x="0" y="0"/>
+          <a:chExt cx="0" cy="0"/>
+        </a:xfrm>
+      </p:grpSpPr>
+      <p:sp>
+        <p:nvSpPr>
+          <p:cNvPr id="4" name="Arc 3">
+            <a:extLst>
+              <a:ext uri="{FF2B5EF4-FFF2-40B4-BE49-F238E27FC236}">
+                <a16:creationId xmlns:a16="http://schemas.microsoft.com/office/drawing/2014/main" id="{71CA9CF1-791F-9B3D-F807-CD03A7F9ACAB}"/>
+              </a:ext>
+            </a:extLst>
+          </p:cNvPr>
+          <p:cNvSpPr/>
+          <p:nvPr/>
+        </p:nvSpPr>
+        <p:spPr>
+          <a:xfrm>
+            <a:off x="3910394" y="960582"/>
+            <a:ext cx="5196661" cy="5095161"/>
+          </a:xfrm>
+          <a:prstGeom prst="arc">
+            <a:avLst>
+              <a:gd name="adj1" fmla="val 8146480"/>
+              <a:gd name="adj2" fmla="val 0"/>
+            </a:avLst>
+          </a:prstGeom>
+        </p:spPr>
+        <p:style>
+          <a:lnRef idx="2">
+            <a:schemeClr val="accent1"/>
+          </a:lnRef>
+          <a:fillRef idx="0">
+            <a:schemeClr val="accent1"/>
+          </a:fillRef>
+          <a:effectRef idx="1">
+            <a:schemeClr val="accent1"/>
+          </a:effectRef>
+          <a:fontRef idx="minor">
+            <a:schemeClr val="tx1"/>
+          </a:fontRef>
+        </p:style>
+        <p:txBody>
+          <a:bodyPr rtlCol="0" anchor="ctr"/>
+          <a:lstStyle/>
+          <a:p>
+            <a:pPr algn="ctr"/>
+            <a:endParaRPr lang="en-NL"/>
+          </a:p>
+        </p:txBody>
+      </p:sp>
+      <p:sp>
+        <p:nvSpPr>
+          <p:cNvPr id="5" name="TextBox 4">
+            <a:extLst>
+              <a:ext uri="{FF2B5EF4-FFF2-40B4-BE49-F238E27FC236}">
+                <a16:creationId xmlns:a16="http://schemas.microsoft.com/office/drawing/2014/main" id="{0E7D9BB0-A75E-9928-B479-F65D270858D1}"/>
+              </a:ext>
+            </a:extLst>
+          </p:cNvPr>
+          <p:cNvSpPr txBox="1"/>
+          <p:nvPr/>
+        </p:nvSpPr>
+        <p:spPr>
+          <a:xfrm>
+            <a:off x="9238891" y="3347049"/>
+            <a:ext cx="645690" cy="369332"/>
+          </a:xfrm>
+          <a:prstGeom prst="rect">
+            <a:avLst/>
+          </a:prstGeom>
+          <a:noFill/>
+        </p:spPr>
+        <p:txBody>
+          <a:bodyPr wrap="none" rtlCol="0">
+            <a:spAutoFit/>
+          </a:bodyPr>
+          <a:lstStyle/>
+          <a:p>
+            <a:r>
+              <a:rPr lang="en-US" dirty="0"/>
+              <a:t>start</a:t>
+            </a:r>
+            <a:endParaRPr lang="en-NL" dirty="0"/>
+          </a:p>
+        </p:txBody>
+      </p:sp>
+      <p:sp>
+        <p:nvSpPr>
+          <p:cNvPr id="6" name="TextBox 5">
+            <a:extLst>
+              <a:ext uri="{FF2B5EF4-FFF2-40B4-BE49-F238E27FC236}">
+                <a16:creationId xmlns:a16="http://schemas.microsoft.com/office/drawing/2014/main" id="{C8F5B502-E006-2A5C-DA16-71113D3E7A3F}"/>
+              </a:ext>
+            </a:extLst>
+          </p:cNvPr>
+          <p:cNvSpPr txBox="1"/>
+          <p:nvPr/>
+        </p:nvSpPr>
+        <p:spPr>
+          <a:xfrm>
+            <a:off x="3344213" y="2033333"/>
+            <a:ext cx="566181" cy="369332"/>
+          </a:xfrm>
+          <a:prstGeom prst="rect">
+            <a:avLst/>
+          </a:prstGeom>
+          <a:noFill/>
+        </p:spPr>
+        <p:txBody>
+          <a:bodyPr wrap="none" rtlCol="0">
+            <a:spAutoFit/>
+          </a:bodyPr>
+          <a:lstStyle/>
+          <a:p>
+            <a:r>
+              <a:rPr lang="en-US" dirty="0"/>
+              <a:t>mid</a:t>
+            </a:r>
+            <a:endParaRPr lang="en-NL" dirty="0"/>
+          </a:p>
+        </p:txBody>
+      </p:sp>
+      <p:sp>
+        <p:nvSpPr>
+          <p:cNvPr id="7" name="TextBox 6">
+            <a:extLst>
+              <a:ext uri="{FF2B5EF4-FFF2-40B4-BE49-F238E27FC236}">
+                <a16:creationId xmlns:a16="http://schemas.microsoft.com/office/drawing/2014/main" id="{2CB5935C-D5BB-18B3-29E2-895E35A16EF6}"/>
+              </a:ext>
+            </a:extLst>
+          </p:cNvPr>
+          <p:cNvSpPr txBox="1"/>
+          <p:nvPr/>
+        </p:nvSpPr>
+        <p:spPr>
+          <a:xfrm>
+            <a:off x="4744528" y="5457009"/>
+            <a:ext cx="562975" cy="369332"/>
+          </a:xfrm>
+          <a:prstGeom prst="rect">
+            <a:avLst/>
+          </a:prstGeom>
+          <a:noFill/>
+        </p:spPr>
+        <p:txBody>
+          <a:bodyPr wrap="none" rtlCol="0">
+            <a:spAutoFit/>
+          </a:bodyPr>
+          <a:lstStyle/>
+          <a:p>
+            <a:r>
+              <a:rPr lang="en-US" dirty="0"/>
+              <a:t>end</a:t>
+            </a:r>
+            <a:endParaRPr lang="en-NL" dirty="0"/>
+          </a:p>
+        </p:txBody>
+      </p:sp>
+      <p:cxnSp>
+        <p:nvCxnSpPr>
+          <p:cNvPr id="2" name="Straight Arrow Connector 1">
+            <a:extLst>
+              <a:ext uri="{FF2B5EF4-FFF2-40B4-BE49-F238E27FC236}">
+                <a16:creationId xmlns:a16="http://schemas.microsoft.com/office/drawing/2014/main" id="{72D61080-968E-818D-51C7-6DB25F3A0E32}"/>
+              </a:ext>
+            </a:extLst>
+          </p:cNvPr>
+          <p:cNvCxnSpPr>
+            <a:cxnSpLocks/>
+            <a:stCxn id="4" idx="2"/>
+          </p:cNvCxnSpPr>
+          <p:nvPr/>
+        </p:nvCxnSpPr>
+        <p:spPr>
+          <a:xfrm flipH="1" flipV="1">
+            <a:off x="4121426" y="2402665"/>
+            <a:ext cx="4985629" cy="1105498"/>
+          </a:xfrm>
+          <a:prstGeom prst="straightConnector1">
+            <a:avLst/>
+          </a:prstGeom>
+          <a:ln>
+            <a:tailEnd type="triangle"/>
+          </a:ln>
+        </p:spPr>
+        <p:style>
+          <a:lnRef idx="2">
+            <a:schemeClr val="accent1"/>
+          </a:lnRef>
+          <a:fillRef idx="0">
+            <a:schemeClr val="accent1"/>
+          </a:fillRef>
+          <a:effectRef idx="1">
+            <a:schemeClr val="accent1"/>
+          </a:effectRef>
+          <a:fontRef idx="minor">
+            <a:schemeClr val="tx1"/>
+          </a:fontRef>
+        </p:style>
+      </p:cxnSp>
+      <p:sp>
+        <p:nvSpPr>
+          <p:cNvPr id="12" name="TextBox 11">
+            <a:extLst>
+              <a:ext uri="{FF2B5EF4-FFF2-40B4-BE49-F238E27FC236}">
+                <a16:creationId xmlns:a16="http://schemas.microsoft.com/office/drawing/2014/main" id="{188B769F-DA90-99CF-2467-5F9B95FF882C}"/>
+              </a:ext>
+            </a:extLst>
+          </p:cNvPr>
+          <p:cNvSpPr txBox="1"/>
+          <p:nvPr/>
+        </p:nvSpPr>
+        <p:spPr>
+          <a:xfrm>
+            <a:off x="5307503" y="2217999"/>
+            <a:ext cx="1458604" cy="369332"/>
+          </a:xfrm>
+          <a:prstGeom prst="rect">
+            <a:avLst/>
+          </a:prstGeom>
+          <a:noFill/>
+        </p:spPr>
+        <p:txBody>
+          <a:bodyPr wrap="none" rtlCol="0">
+            <a:spAutoFit/>
+          </a:bodyPr>
+          <a:lstStyle/>
+          <a:p>
+            <a:r>
+              <a:rPr lang="en-US" dirty="0" err="1"/>
+              <a:t>Start_to_mid</a:t>
+            </a:r>
+            <a:endParaRPr lang="en-US" dirty="0"/>
+          </a:p>
+        </p:txBody>
+      </p:sp>
+      <p:cxnSp>
+        <p:nvCxnSpPr>
+          <p:cNvPr id="15" name="Straight Arrow Connector 14">
+            <a:extLst>
+              <a:ext uri="{FF2B5EF4-FFF2-40B4-BE49-F238E27FC236}">
+                <a16:creationId xmlns:a16="http://schemas.microsoft.com/office/drawing/2014/main" id="{42101F61-C5B7-4D82-EDA4-1BDEC8697602}"/>
+              </a:ext>
+            </a:extLst>
+          </p:cNvPr>
+          <p:cNvCxnSpPr>
+            <a:cxnSpLocks/>
+            <a:stCxn id="4" idx="2"/>
+            <a:endCxn id="4" idx="0"/>
+          </p:cNvCxnSpPr>
+          <p:nvPr/>
+        </p:nvCxnSpPr>
+        <p:spPr>
+          <a:xfrm flipH="1">
+            <a:off x="4664716" y="3508163"/>
+            <a:ext cx="4442339" cy="1794806"/>
+          </a:xfrm>
+          <a:prstGeom prst="straightConnector1">
+            <a:avLst/>
+          </a:prstGeom>
+          <a:ln>
+            <a:tailEnd type="triangle"/>
+          </a:ln>
+        </p:spPr>
+        <p:style>
+          <a:lnRef idx="2">
+            <a:schemeClr val="accent1"/>
+          </a:lnRef>
+          <a:fillRef idx="0">
+            <a:schemeClr val="accent1"/>
+          </a:fillRef>
+          <a:effectRef idx="1">
+            <a:schemeClr val="accent1"/>
+          </a:effectRef>
+          <a:fontRef idx="minor">
+            <a:schemeClr val="tx1"/>
+          </a:fontRef>
+        </p:style>
+      </p:cxnSp>
+      <p:sp>
+        <p:nvSpPr>
+          <p:cNvPr id="24" name="TextBox 23">
+            <a:extLst>
+              <a:ext uri="{FF2B5EF4-FFF2-40B4-BE49-F238E27FC236}">
+                <a16:creationId xmlns:a16="http://schemas.microsoft.com/office/drawing/2014/main" id="{E3CC1C0C-CB30-CA1D-C9A1-54E333E6E32C}"/>
+              </a:ext>
+            </a:extLst>
+          </p:cNvPr>
+          <p:cNvSpPr txBox="1"/>
+          <p:nvPr/>
+        </p:nvSpPr>
+        <p:spPr>
+          <a:xfrm>
+            <a:off x="5307503" y="3861553"/>
+            <a:ext cx="1455398" cy="369332"/>
+          </a:xfrm>
+          <a:prstGeom prst="rect">
+            <a:avLst/>
+          </a:prstGeom>
+          <a:noFill/>
+        </p:spPr>
+        <p:txBody>
+          <a:bodyPr wrap="none" rtlCol="0">
+            <a:spAutoFit/>
+          </a:bodyPr>
+          <a:lstStyle/>
+          <a:p>
+            <a:r>
+              <a:rPr lang="en-US" dirty="0" err="1"/>
+              <a:t>Start_to_end</a:t>
+            </a:r>
+            <a:endParaRPr lang="en-US" dirty="0"/>
+          </a:p>
+        </p:txBody>
+      </p:sp>
+      <p:cxnSp>
+        <p:nvCxnSpPr>
+          <p:cNvPr id="28" name="Straight Arrow Connector 27">
+            <a:extLst>
+              <a:ext uri="{FF2B5EF4-FFF2-40B4-BE49-F238E27FC236}">
+                <a16:creationId xmlns:a16="http://schemas.microsoft.com/office/drawing/2014/main" id="{BFD22CF7-2C3C-B061-21A4-4FD3496D9B35}"/>
+              </a:ext>
+            </a:extLst>
+          </p:cNvPr>
+          <p:cNvCxnSpPr>
+            <a:cxnSpLocks/>
+          </p:cNvCxnSpPr>
+          <p:nvPr/>
+        </p:nvCxnSpPr>
+        <p:spPr>
+          <a:xfrm>
+            <a:off x="4121426" y="2432119"/>
+            <a:ext cx="623102" cy="2904264"/>
+          </a:xfrm>
+          <a:prstGeom prst="straightConnector1">
+            <a:avLst/>
+          </a:prstGeom>
+          <a:ln>
+            <a:tailEnd type="triangle"/>
+          </a:ln>
+        </p:spPr>
+        <p:style>
+          <a:lnRef idx="2">
+            <a:schemeClr val="accent1"/>
+          </a:lnRef>
+          <a:fillRef idx="0">
+            <a:schemeClr val="accent1"/>
+          </a:fillRef>
+          <a:effectRef idx="1">
+            <a:schemeClr val="accent1"/>
+          </a:effectRef>
+          <a:fontRef idx="minor">
+            <a:schemeClr val="tx1"/>
+          </a:fontRef>
+        </p:style>
+      </p:cxnSp>
+      <p:sp>
+        <p:nvSpPr>
+          <p:cNvPr id="32" name="TextBox 31">
+            <a:extLst>
+              <a:ext uri="{FF2B5EF4-FFF2-40B4-BE49-F238E27FC236}">
+                <a16:creationId xmlns:a16="http://schemas.microsoft.com/office/drawing/2014/main" id="{6FE5DA95-BA87-5097-E863-8D7163A1D4F5}"/>
+              </a:ext>
+            </a:extLst>
+          </p:cNvPr>
+          <p:cNvSpPr txBox="1"/>
+          <p:nvPr/>
+        </p:nvSpPr>
+        <p:spPr>
+          <a:xfrm>
+            <a:off x="4432977" y="3252531"/>
+            <a:ext cx="1356910" cy="369332"/>
+          </a:xfrm>
+          <a:prstGeom prst="rect">
+            <a:avLst/>
+          </a:prstGeom>
+          <a:noFill/>
+        </p:spPr>
+        <p:txBody>
+          <a:bodyPr wrap="none" rtlCol="0">
+            <a:spAutoFit/>
+          </a:bodyPr>
+          <a:lstStyle/>
+          <a:p>
+            <a:r>
+              <a:rPr lang="en-US" dirty="0" err="1"/>
+              <a:t>mid_to_end</a:t>
+            </a:r>
+            <a:endParaRPr lang="en-US" dirty="0"/>
+          </a:p>
+        </p:txBody>
+      </p:sp>
+    </p:spTree>
+    <p:extLst>
+      <p:ext uri="{BB962C8B-B14F-4D97-AF65-F5344CB8AC3E}">
+        <p14:creationId xmlns:p14="http://schemas.microsoft.com/office/powerpoint/2010/main" val="69446625"/>
       </p:ext>
     </p:extLst>
   </p:cSld>

</xml_diff>

<commit_message>
removed color methods which retrieve color values from a file. they're not referenced anywhere. also, made small_tests.py and polycurve2d.py work
</commit_message>
<xml_diff>
--- a/docs/functions.pptx
+++ b/docs/functions.pptx
@@ -7,6 +7,7 @@
   <p:sldIdLst>
     <p:sldId id="256" r:id="rId2"/>
     <p:sldId id="257" r:id="rId3"/>
+    <p:sldId id="258" r:id="rId4"/>
   </p:sldIdLst>
   <p:sldSz cx="12192000" cy="6858000"/>
   <p:notesSz cx="6858000" cy="9144000"/>
@@ -262,7 +263,7 @@
           <a:p>
             <a:fld id="{7BE618FE-686D-4E7D-BDA2-690D38C5FF0A}" type="datetimeFigureOut">
               <a:rPr lang="en-NL" smtClean="0"/>
-              <a:t>03/05/2025</a:t>
+              <a:t>03/12/2025</a:t>
             </a:fld>
             <a:endParaRPr lang="en-NL"/>
           </a:p>
@@ -316,7 +317,7 @@
           <a:p>
             <a:fld id="{2147172F-F82B-4888-ADB3-DA5C716E56B8}" type="slidenum">
               <a:rPr lang="en-NL" smtClean="0"/>
-              <a:t>‹#›</a:t>
+              <a:t>‹nr.›</a:t>
             </a:fld>
             <a:endParaRPr lang="en-NL"/>
           </a:p>
@@ -462,7 +463,7 @@
           <a:p>
             <a:fld id="{7BE618FE-686D-4E7D-BDA2-690D38C5FF0A}" type="datetimeFigureOut">
               <a:rPr lang="en-NL" smtClean="0"/>
-              <a:t>03/05/2025</a:t>
+              <a:t>03/12/2025</a:t>
             </a:fld>
             <a:endParaRPr lang="en-NL"/>
           </a:p>
@@ -516,7 +517,7 @@
           <a:p>
             <a:fld id="{2147172F-F82B-4888-ADB3-DA5C716E56B8}" type="slidenum">
               <a:rPr lang="en-NL" smtClean="0"/>
-              <a:t>‹#›</a:t>
+              <a:t>‹nr.›</a:t>
             </a:fld>
             <a:endParaRPr lang="en-NL"/>
           </a:p>
@@ -672,7 +673,7 @@
           <a:p>
             <a:fld id="{7BE618FE-686D-4E7D-BDA2-690D38C5FF0A}" type="datetimeFigureOut">
               <a:rPr lang="en-NL" smtClean="0"/>
-              <a:t>03/05/2025</a:t>
+              <a:t>03/12/2025</a:t>
             </a:fld>
             <a:endParaRPr lang="en-NL"/>
           </a:p>
@@ -726,7 +727,7 @@
           <a:p>
             <a:fld id="{2147172F-F82B-4888-ADB3-DA5C716E56B8}" type="slidenum">
               <a:rPr lang="en-NL" smtClean="0"/>
-              <a:t>‹#›</a:t>
+              <a:t>‹nr.›</a:t>
             </a:fld>
             <a:endParaRPr lang="en-NL"/>
           </a:p>
@@ -872,7 +873,7 @@
           <a:p>
             <a:fld id="{7BE618FE-686D-4E7D-BDA2-690D38C5FF0A}" type="datetimeFigureOut">
               <a:rPr lang="en-NL" smtClean="0"/>
-              <a:t>03/05/2025</a:t>
+              <a:t>03/12/2025</a:t>
             </a:fld>
             <a:endParaRPr lang="en-NL"/>
           </a:p>
@@ -926,7 +927,7 @@
           <a:p>
             <a:fld id="{2147172F-F82B-4888-ADB3-DA5C716E56B8}" type="slidenum">
               <a:rPr lang="en-NL" smtClean="0"/>
-              <a:t>‹#›</a:t>
+              <a:t>‹nr.›</a:t>
             </a:fld>
             <a:endParaRPr lang="en-NL"/>
           </a:p>
@@ -1148,7 +1149,7 @@
           <a:p>
             <a:fld id="{7BE618FE-686D-4E7D-BDA2-690D38C5FF0A}" type="datetimeFigureOut">
               <a:rPr lang="en-NL" smtClean="0"/>
-              <a:t>03/05/2025</a:t>
+              <a:t>03/12/2025</a:t>
             </a:fld>
             <a:endParaRPr lang="en-NL"/>
           </a:p>
@@ -1202,7 +1203,7 @@
           <a:p>
             <a:fld id="{2147172F-F82B-4888-ADB3-DA5C716E56B8}" type="slidenum">
               <a:rPr lang="en-NL" smtClean="0"/>
-              <a:t>‹#›</a:t>
+              <a:t>‹nr.›</a:t>
             </a:fld>
             <a:endParaRPr lang="en-NL"/>
           </a:p>
@@ -1416,7 +1417,7 @@
           <a:p>
             <a:fld id="{7BE618FE-686D-4E7D-BDA2-690D38C5FF0A}" type="datetimeFigureOut">
               <a:rPr lang="en-NL" smtClean="0"/>
-              <a:t>03/05/2025</a:t>
+              <a:t>03/12/2025</a:t>
             </a:fld>
             <a:endParaRPr lang="en-NL"/>
           </a:p>
@@ -1470,7 +1471,7 @@
           <a:p>
             <a:fld id="{2147172F-F82B-4888-ADB3-DA5C716E56B8}" type="slidenum">
               <a:rPr lang="en-NL" smtClean="0"/>
-              <a:t>‹#›</a:t>
+              <a:t>‹nr.›</a:t>
             </a:fld>
             <a:endParaRPr lang="en-NL"/>
           </a:p>
@@ -1831,7 +1832,7 @@
           <a:p>
             <a:fld id="{7BE618FE-686D-4E7D-BDA2-690D38C5FF0A}" type="datetimeFigureOut">
               <a:rPr lang="en-NL" smtClean="0"/>
-              <a:t>03/05/2025</a:t>
+              <a:t>03/12/2025</a:t>
             </a:fld>
             <a:endParaRPr lang="en-NL"/>
           </a:p>
@@ -1885,7 +1886,7 @@
           <a:p>
             <a:fld id="{2147172F-F82B-4888-ADB3-DA5C716E56B8}" type="slidenum">
               <a:rPr lang="en-NL" smtClean="0"/>
-              <a:t>‹#›</a:t>
+              <a:t>‹nr.›</a:t>
             </a:fld>
             <a:endParaRPr lang="en-NL"/>
           </a:p>
@@ -1973,7 +1974,7 @@
           <a:p>
             <a:fld id="{7BE618FE-686D-4E7D-BDA2-690D38C5FF0A}" type="datetimeFigureOut">
               <a:rPr lang="en-NL" smtClean="0"/>
-              <a:t>03/05/2025</a:t>
+              <a:t>03/12/2025</a:t>
             </a:fld>
             <a:endParaRPr lang="en-NL"/>
           </a:p>
@@ -2027,7 +2028,7 @@
           <a:p>
             <a:fld id="{2147172F-F82B-4888-ADB3-DA5C716E56B8}" type="slidenum">
               <a:rPr lang="en-NL" smtClean="0"/>
-              <a:t>‹#›</a:t>
+              <a:t>‹nr.›</a:t>
             </a:fld>
             <a:endParaRPr lang="en-NL"/>
           </a:p>
@@ -2086,7 +2087,7 @@
           <a:p>
             <a:fld id="{7BE618FE-686D-4E7D-BDA2-690D38C5FF0A}" type="datetimeFigureOut">
               <a:rPr lang="en-NL" smtClean="0"/>
-              <a:t>03/05/2025</a:t>
+              <a:t>03/12/2025</a:t>
             </a:fld>
             <a:endParaRPr lang="en-NL"/>
           </a:p>
@@ -2140,7 +2141,7 @@
           <a:p>
             <a:fld id="{2147172F-F82B-4888-ADB3-DA5C716E56B8}" type="slidenum">
               <a:rPr lang="en-NL" smtClean="0"/>
-              <a:t>‹#›</a:t>
+              <a:t>‹nr.›</a:t>
             </a:fld>
             <a:endParaRPr lang="en-NL"/>
           </a:p>
@@ -2399,7 +2400,7 @@
           <a:p>
             <a:fld id="{7BE618FE-686D-4E7D-BDA2-690D38C5FF0A}" type="datetimeFigureOut">
               <a:rPr lang="en-NL" smtClean="0"/>
-              <a:t>03/05/2025</a:t>
+              <a:t>03/12/2025</a:t>
             </a:fld>
             <a:endParaRPr lang="en-NL"/>
           </a:p>
@@ -2453,7 +2454,7 @@
           <a:p>
             <a:fld id="{2147172F-F82B-4888-ADB3-DA5C716E56B8}" type="slidenum">
               <a:rPr lang="en-NL" smtClean="0"/>
-              <a:t>‹#›</a:t>
+              <a:t>‹nr.›</a:t>
             </a:fld>
             <a:endParaRPr lang="en-NL"/>
           </a:p>
@@ -2688,7 +2689,7 @@
           <a:p>
             <a:fld id="{7BE618FE-686D-4E7D-BDA2-690D38C5FF0A}" type="datetimeFigureOut">
               <a:rPr lang="en-NL" smtClean="0"/>
-              <a:t>03/05/2025</a:t>
+              <a:t>03/12/2025</a:t>
             </a:fld>
             <a:endParaRPr lang="en-NL"/>
           </a:p>
@@ -2742,7 +2743,7 @@
           <a:p>
             <a:fld id="{2147172F-F82B-4888-ADB3-DA5C716E56B8}" type="slidenum">
               <a:rPr lang="en-NL" smtClean="0"/>
-              <a:t>‹#›</a:t>
+              <a:t>‹nr.›</a:t>
             </a:fld>
             <a:endParaRPr lang="en-NL"/>
           </a:p>
@@ -2931,7 +2932,7 @@
           <a:p>
             <a:fld id="{7BE618FE-686D-4E7D-BDA2-690D38C5FF0A}" type="datetimeFigureOut">
               <a:rPr lang="en-NL" smtClean="0"/>
-              <a:t>03/05/2025</a:t>
+              <a:t>03/12/2025</a:t>
             </a:fld>
             <a:endParaRPr lang="en-NL"/>
           </a:p>
@@ -3021,7 +3022,7 @@
           <a:p>
             <a:fld id="{2147172F-F82B-4888-ADB3-DA5C716E56B8}" type="slidenum">
               <a:rPr lang="en-NL" smtClean="0"/>
-              <a:t>‹#›</a:t>
+              <a:t>‹nr.›</a:t>
             </a:fld>
             <a:endParaRPr lang="en-NL"/>
           </a:p>
@@ -4351,6 +4352,599 @@
     <p:extLst>
       <p:ext uri="{BB962C8B-B14F-4D97-AF65-F5344CB8AC3E}">
         <p14:creationId xmlns:p14="http://schemas.microsoft.com/office/powerpoint/2010/main" val="69446625"/>
+      </p:ext>
+    </p:extLst>
+  </p:cSld>
+  <p:clrMapOvr>
+    <a:masterClrMapping/>
+  </p:clrMapOvr>
+</p:sld>
+</file>
+
+<file path=ppt/slides/slide3.xml><?xml version="1.0" encoding="utf-8"?>
+<p:sld xmlns:a="http://schemas.openxmlformats.org/drawingml/2006/main" xmlns:r="http://schemas.openxmlformats.org/officeDocument/2006/relationships" xmlns:p="http://schemas.openxmlformats.org/presentationml/2006/main">
+  <p:cSld>
+    <p:spTree>
+      <p:nvGrpSpPr>
+        <p:cNvPr id="1" name=""/>
+        <p:cNvGrpSpPr/>
+        <p:nvPr/>
+      </p:nvGrpSpPr>
+      <p:grpSpPr>
+        <a:xfrm>
+          <a:off x="0" y="0"/>
+          <a:ext cx="0" cy="0"/>
+          <a:chOff x="0" y="0"/>
+          <a:chExt cx="0" cy="0"/>
+        </a:xfrm>
+      </p:grpSpPr>
+      <p:cxnSp>
+        <p:nvCxnSpPr>
+          <p:cNvPr id="9" name="Rechte verbindingslijn 8">
+            <a:extLst>
+              <a:ext uri="{FF2B5EF4-FFF2-40B4-BE49-F238E27FC236}">
+                <a16:creationId xmlns:a16="http://schemas.microsoft.com/office/drawing/2014/main" id="{252BAD32-7B48-20A5-0708-CE3329C51E90}"/>
+              </a:ext>
+            </a:extLst>
+          </p:cNvPr>
+          <p:cNvCxnSpPr>
+            <a:cxnSpLocks/>
+          </p:cNvCxnSpPr>
+          <p:nvPr/>
+        </p:nvCxnSpPr>
+        <p:spPr>
+          <a:xfrm>
+            <a:off x="5106838" y="1086928"/>
+            <a:ext cx="0" cy="3838755"/>
+          </a:xfrm>
+          <a:prstGeom prst="line">
+            <a:avLst/>
+          </a:prstGeom>
+        </p:spPr>
+        <p:style>
+          <a:lnRef idx="2">
+            <a:schemeClr val="accent1"/>
+          </a:lnRef>
+          <a:fillRef idx="0">
+            <a:schemeClr val="accent1"/>
+          </a:fillRef>
+          <a:effectRef idx="1">
+            <a:schemeClr val="accent1"/>
+          </a:effectRef>
+          <a:fontRef idx="minor">
+            <a:schemeClr val="tx1"/>
+          </a:fontRef>
+        </p:style>
+      </p:cxnSp>
+      <p:cxnSp>
+        <p:nvCxnSpPr>
+          <p:cNvPr id="11" name="Rechte verbindingslijn 10">
+            <a:extLst>
+              <a:ext uri="{FF2B5EF4-FFF2-40B4-BE49-F238E27FC236}">
+                <a16:creationId xmlns:a16="http://schemas.microsoft.com/office/drawing/2014/main" id="{AE4E9F4A-EDD8-03FA-D519-8E43CBED1352}"/>
+              </a:ext>
+            </a:extLst>
+          </p:cNvPr>
+          <p:cNvCxnSpPr>
+            <a:cxnSpLocks/>
+          </p:cNvCxnSpPr>
+          <p:nvPr/>
+        </p:nvCxnSpPr>
+        <p:spPr>
+          <a:xfrm>
+            <a:off x="5750943" y="1086928"/>
+            <a:ext cx="0" cy="3838755"/>
+          </a:xfrm>
+          <a:prstGeom prst="line">
+            <a:avLst/>
+          </a:prstGeom>
+        </p:spPr>
+        <p:style>
+          <a:lnRef idx="2">
+            <a:schemeClr val="accent1"/>
+          </a:lnRef>
+          <a:fillRef idx="0">
+            <a:schemeClr val="accent1"/>
+          </a:fillRef>
+          <a:effectRef idx="1">
+            <a:schemeClr val="accent1"/>
+          </a:effectRef>
+          <a:fontRef idx="minor">
+            <a:schemeClr val="tx1"/>
+          </a:fontRef>
+        </p:style>
+      </p:cxnSp>
+      <p:cxnSp>
+        <p:nvCxnSpPr>
+          <p:cNvPr id="12" name="Rechte verbindingslijn 11">
+            <a:extLst>
+              <a:ext uri="{FF2B5EF4-FFF2-40B4-BE49-F238E27FC236}">
+                <a16:creationId xmlns:a16="http://schemas.microsoft.com/office/drawing/2014/main" id="{C22533CA-63E5-C32D-1CAA-2597CE9FF6FA}"/>
+              </a:ext>
+            </a:extLst>
+          </p:cNvPr>
+          <p:cNvCxnSpPr>
+            <a:cxnSpLocks/>
+          </p:cNvCxnSpPr>
+          <p:nvPr/>
+        </p:nvCxnSpPr>
+        <p:spPr>
+          <a:xfrm>
+            <a:off x="6432430" y="1086928"/>
+            <a:ext cx="0" cy="3838755"/>
+          </a:xfrm>
+          <a:prstGeom prst="line">
+            <a:avLst/>
+          </a:prstGeom>
+        </p:spPr>
+        <p:style>
+          <a:lnRef idx="2">
+            <a:schemeClr val="accent1"/>
+          </a:lnRef>
+          <a:fillRef idx="0">
+            <a:schemeClr val="accent1"/>
+          </a:fillRef>
+          <a:effectRef idx="1">
+            <a:schemeClr val="accent1"/>
+          </a:effectRef>
+          <a:fontRef idx="minor">
+            <a:schemeClr val="tx1"/>
+          </a:fontRef>
+        </p:style>
+      </p:cxnSp>
+      <p:cxnSp>
+        <p:nvCxnSpPr>
+          <p:cNvPr id="13" name="Rechte verbindingslijn 12">
+            <a:extLst>
+              <a:ext uri="{FF2B5EF4-FFF2-40B4-BE49-F238E27FC236}">
+                <a16:creationId xmlns:a16="http://schemas.microsoft.com/office/drawing/2014/main" id="{AE14A0FD-F798-87EB-5A50-127D6493BCB5}"/>
+              </a:ext>
+            </a:extLst>
+          </p:cNvPr>
+          <p:cNvCxnSpPr>
+            <a:cxnSpLocks/>
+          </p:cNvCxnSpPr>
+          <p:nvPr/>
+        </p:nvCxnSpPr>
+        <p:spPr>
+          <a:xfrm>
+            <a:off x="7122543" y="1086928"/>
+            <a:ext cx="0" cy="3838755"/>
+          </a:xfrm>
+          <a:prstGeom prst="line">
+            <a:avLst/>
+          </a:prstGeom>
+        </p:spPr>
+        <p:style>
+          <a:lnRef idx="2">
+            <a:schemeClr val="accent1"/>
+          </a:lnRef>
+          <a:fillRef idx="0">
+            <a:schemeClr val="accent1"/>
+          </a:fillRef>
+          <a:effectRef idx="1">
+            <a:schemeClr val="accent1"/>
+          </a:effectRef>
+          <a:fontRef idx="minor">
+            <a:schemeClr val="tx1"/>
+          </a:fontRef>
+        </p:style>
+      </p:cxnSp>
+      <p:cxnSp>
+        <p:nvCxnSpPr>
+          <p:cNvPr id="14" name="Rechte verbindingslijn 13">
+            <a:extLst>
+              <a:ext uri="{FF2B5EF4-FFF2-40B4-BE49-F238E27FC236}">
+                <a16:creationId xmlns:a16="http://schemas.microsoft.com/office/drawing/2014/main" id="{F3C09555-3BBC-41A6-6B81-77F74C02567D}"/>
+              </a:ext>
+            </a:extLst>
+          </p:cNvPr>
+          <p:cNvCxnSpPr>
+            <a:cxnSpLocks/>
+          </p:cNvCxnSpPr>
+          <p:nvPr/>
+        </p:nvCxnSpPr>
+        <p:spPr>
+          <a:xfrm flipH="1">
+            <a:off x="4300268" y="1782793"/>
+            <a:ext cx="3591464" cy="0"/>
+          </a:xfrm>
+          <a:prstGeom prst="line">
+            <a:avLst/>
+          </a:prstGeom>
+        </p:spPr>
+        <p:style>
+          <a:lnRef idx="2">
+            <a:schemeClr val="accent1"/>
+          </a:lnRef>
+          <a:fillRef idx="0">
+            <a:schemeClr val="accent1"/>
+          </a:fillRef>
+          <a:effectRef idx="1">
+            <a:schemeClr val="accent1"/>
+          </a:effectRef>
+          <a:fontRef idx="minor">
+            <a:schemeClr val="tx1"/>
+          </a:fontRef>
+        </p:style>
+      </p:cxnSp>
+      <p:cxnSp>
+        <p:nvCxnSpPr>
+          <p:cNvPr id="17" name="Rechte verbindingslijn 16">
+            <a:extLst>
+              <a:ext uri="{FF2B5EF4-FFF2-40B4-BE49-F238E27FC236}">
+                <a16:creationId xmlns:a16="http://schemas.microsoft.com/office/drawing/2014/main" id="{4D9D6091-131B-159F-8134-2CB24EF7BAAF}"/>
+              </a:ext>
+            </a:extLst>
+          </p:cNvPr>
+          <p:cNvCxnSpPr>
+            <a:cxnSpLocks/>
+          </p:cNvCxnSpPr>
+          <p:nvPr/>
+        </p:nvCxnSpPr>
+        <p:spPr>
+          <a:xfrm flipH="1">
+            <a:off x="4219754" y="2510287"/>
+            <a:ext cx="3752491" cy="0"/>
+          </a:xfrm>
+          <a:prstGeom prst="line">
+            <a:avLst/>
+          </a:prstGeom>
+        </p:spPr>
+        <p:style>
+          <a:lnRef idx="2">
+            <a:schemeClr val="accent1"/>
+          </a:lnRef>
+          <a:fillRef idx="0">
+            <a:schemeClr val="accent1"/>
+          </a:fillRef>
+          <a:effectRef idx="1">
+            <a:schemeClr val="accent1"/>
+          </a:effectRef>
+          <a:fontRef idx="minor">
+            <a:schemeClr val="tx1"/>
+          </a:fontRef>
+        </p:style>
+      </p:cxnSp>
+      <p:cxnSp>
+        <p:nvCxnSpPr>
+          <p:cNvPr id="20" name="Rechte verbindingslijn 19">
+            <a:extLst>
+              <a:ext uri="{FF2B5EF4-FFF2-40B4-BE49-F238E27FC236}">
+                <a16:creationId xmlns:a16="http://schemas.microsoft.com/office/drawing/2014/main" id="{2B63F8D5-8EB0-157C-AFCA-CDFF7E7BAD6D}"/>
+              </a:ext>
+            </a:extLst>
+          </p:cNvPr>
+          <p:cNvCxnSpPr>
+            <a:cxnSpLocks/>
+          </p:cNvCxnSpPr>
+          <p:nvPr/>
+        </p:nvCxnSpPr>
+        <p:spPr>
+          <a:xfrm flipH="1">
+            <a:off x="4219754" y="3223404"/>
+            <a:ext cx="3752491" cy="0"/>
+          </a:xfrm>
+          <a:prstGeom prst="line">
+            <a:avLst/>
+          </a:prstGeom>
+        </p:spPr>
+        <p:style>
+          <a:lnRef idx="2">
+            <a:schemeClr val="accent1"/>
+          </a:lnRef>
+          <a:fillRef idx="0">
+            <a:schemeClr val="accent1"/>
+          </a:fillRef>
+          <a:effectRef idx="1">
+            <a:schemeClr val="accent1"/>
+          </a:effectRef>
+          <a:fontRef idx="minor">
+            <a:schemeClr val="tx1"/>
+          </a:fontRef>
+        </p:style>
+      </p:cxnSp>
+      <p:cxnSp>
+        <p:nvCxnSpPr>
+          <p:cNvPr id="21" name="Rechte verbindingslijn 20">
+            <a:extLst>
+              <a:ext uri="{FF2B5EF4-FFF2-40B4-BE49-F238E27FC236}">
+                <a16:creationId xmlns:a16="http://schemas.microsoft.com/office/drawing/2014/main" id="{68CB9FB4-7B51-15AA-341E-210AC091C89D}"/>
+              </a:ext>
+            </a:extLst>
+          </p:cNvPr>
+          <p:cNvCxnSpPr>
+            <a:cxnSpLocks/>
+          </p:cNvCxnSpPr>
+          <p:nvPr/>
+        </p:nvCxnSpPr>
+        <p:spPr>
+          <a:xfrm flipH="1">
+            <a:off x="4139241" y="3904891"/>
+            <a:ext cx="3752491" cy="0"/>
+          </a:xfrm>
+          <a:prstGeom prst="line">
+            <a:avLst/>
+          </a:prstGeom>
+        </p:spPr>
+        <p:style>
+          <a:lnRef idx="2">
+            <a:schemeClr val="accent1"/>
+          </a:lnRef>
+          <a:fillRef idx="0">
+            <a:schemeClr val="accent1"/>
+          </a:fillRef>
+          <a:effectRef idx="1">
+            <a:schemeClr val="accent1"/>
+          </a:effectRef>
+          <a:fontRef idx="minor">
+            <a:schemeClr val="tx1"/>
+          </a:fontRef>
+        </p:style>
+      </p:cxnSp>
+      <p:sp>
+        <p:nvSpPr>
+          <p:cNvPr id="22" name="Tekstvak 21">
+            <a:extLst>
+              <a:ext uri="{FF2B5EF4-FFF2-40B4-BE49-F238E27FC236}">
+                <a16:creationId xmlns:a16="http://schemas.microsoft.com/office/drawing/2014/main" id="{28096081-3981-65C2-623C-503A3A6048F3}"/>
+              </a:ext>
+            </a:extLst>
+          </p:cNvPr>
+          <p:cNvSpPr txBox="1"/>
+          <p:nvPr/>
+        </p:nvSpPr>
+        <p:spPr>
+          <a:xfrm>
+            <a:off x="5112809" y="1153063"/>
+            <a:ext cx="678391" cy="369332"/>
+          </a:xfrm>
+          <a:prstGeom prst="rect">
+            <a:avLst/>
+          </a:prstGeom>
+          <a:noFill/>
+        </p:spPr>
+        <p:txBody>
+          <a:bodyPr wrap="none" rtlCol="0">
+            <a:spAutoFit/>
+          </a:bodyPr>
+          <a:lstStyle/>
+          <a:p>
+            <a:r>
+              <a:rPr lang="nl-NL" dirty="0"/>
+              <a:t>5400</a:t>
+            </a:r>
+          </a:p>
+        </p:txBody>
+      </p:sp>
+      <p:cxnSp>
+        <p:nvCxnSpPr>
+          <p:cNvPr id="24" name="Rechte verbindingslijn met pijl 23">
+            <a:extLst>
+              <a:ext uri="{FF2B5EF4-FFF2-40B4-BE49-F238E27FC236}">
+                <a16:creationId xmlns:a16="http://schemas.microsoft.com/office/drawing/2014/main" id="{1756D235-1462-6099-A65A-87D1136E1EF1}"/>
+              </a:ext>
+            </a:extLst>
+          </p:cNvPr>
+          <p:cNvCxnSpPr/>
+          <p:nvPr/>
+        </p:nvCxnSpPr>
+        <p:spPr>
+          <a:xfrm>
+            <a:off x="5106838" y="1522395"/>
+            <a:ext cx="644105" cy="0"/>
+          </a:xfrm>
+          <a:prstGeom prst="straightConnector1">
+            <a:avLst/>
+          </a:prstGeom>
+          <a:ln>
+            <a:headEnd type="triangle"/>
+            <a:tailEnd type="triangle"/>
+          </a:ln>
+        </p:spPr>
+        <p:style>
+          <a:lnRef idx="2">
+            <a:schemeClr val="accent1"/>
+          </a:lnRef>
+          <a:fillRef idx="0">
+            <a:schemeClr val="accent1"/>
+          </a:fillRef>
+          <a:effectRef idx="1">
+            <a:schemeClr val="accent1"/>
+          </a:effectRef>
+          <a:fontRef idx="minor">
+            <a:schemeClr val="tx1"/>
+          </a:fontRef>
+        </p:style>
+      </p:cxnSp>
+      <p:cxnSp>
+        <p:nvCxnSpPr>
+          <p:cNvPr id="25" name="Rechte verbindingslijn 24">
+            <a:extLst>
+              <a:ext uri="{FF2B5EF4-FFF2-40B4-BE49-F238E27FC236}">
+                <a16:creationId xmlns:a16="http://schemas.microsoft.com/office/drawing/2014/main" id="{58E0BC8E-A1DC-867C-41C4-8D71A23677A0}"/>
+              </a:ext>
+            </a:extLst>
+          </p:cNvPr>
+          <p:cNvCxnSpPr>
+            <a:cxnSpLocks/>
+          </p:cNvCxnSpPr>
+          <p:nvPr/>
+        </p:nvCxnSpPr>
+        <p:spPr>
+          <a:xfrm>
+            <a:off x="4491487" y="1131331"/>
+            <a:ext cx="0" cy="3838755"/>
+          </a:xfrm>
+          <a:prstGeom prst="line">
+            <a:avLst/>
+          </a:prstGeom>
+        </p:spPr>
+        <p:style>
+          <a:lnRef idx="2">
+            <a:schemeClr val="accent1"/>
+          </a:lnRef>
+          <a:fillRef idx="0">
+            <a:schemeClr val="accent1"/>
+          </a:fillRef>
+          <a:effectRef idx="1">
+            <a:schemeClr val="accent1"/>
+          </a:effectRef>
+          <a:fontRef idx="minor">
+            <a:schemeClr val="tx1"/>
+          </a:fontRef>
+        </p:style>
+      </p:cxnSp>
+      <p:cxnSp>
+        <p:nvCxnSpPr>
+          <p:cNvPr id="26" name="Rechte verbindingslijn met pijl 25">
+            <a:extLst>
+              <a:ext uri="{FF2B5EF4-FFF2-40B4-BE49-F238E27FC236}">
+                <a16:creationId xmlns:a16="http://schemas.microsoft.com/office/drawing/2014/main" id="{7D585EEF-4C01-3149-9611-174C15E45596}"/>
+              </a:ext>
+            </a:extLst>
+          </p:cNvPr>
+          <p:cNvCxnSpPr/>
+          <p:nvPr/>
+        </p:nvCxnSpPr>
+        <p:spPr>
+          <a:xfrm>
+            <a:off x="4462733" y="1523665"/>
+            <a:ext cx="644105" cy="0"/>
+          </a:xfrm>
+          <a:prstGeom prst="straightConnector1">
+            <a:avLst/>
+          </a:prstGeom>
+          <a:ln>
+            <a:headEnd type="triangle"/>
+            <a:tailEnd type="triangle"/>
+          </a:ln>
+        </p:spPr>
+        <p:style>
+          <a:lnRef idx="2">
+            <a:schemeClr val="accent1"/>
+          </a:lnRef>
+          <a:fillRef idx="0">
+            <a:schemeClr val="accent1"/>
+          </a:fillRef>
+          <a:effectRef idx="1">
+            <a:schemeClr val="accent1"/>
+          </a:effectRef>
+          <a:fontRef idx="minor">
+            <a:schemeClr val="tx1"/>
+          </a:fontRef>
+        </p:style>
+      </p:cxnSp>
+      <p:sp>
+        <p:nvSpPr>
+          <p:cNvPr id="27" name="Tekstvak 26">
+            <a:extLst>
+              <a:ext uri="{FF2B5EF4-FFF2-40B4-BE49-F238E27FC236}">
+                <a16:creationId xmlns:a16="http://schemas.microsoft.com/office/drawing/2014/main" id="{993CDF03-5892-D438-7020-891F2264F74B}"/>
+              </a:ext>
+            </a:extLst>
+          </p:cNvPr>
+          <p:cNvSpPr txBox="1"/>
+          <p:nvPr/>
+        </p:nvSpPr>
+        <p:spPr>
+          <a:xfrm>
+            <a:off x="4452999" y="1114411"/>
+            <a:ext cx="678391" cy="369332"/>
+          </a:xfrm>
+          <a:prstGeom prst="rect">
+            <a:avLst/>
+          </a:prstGeom>
+          <a:noFill/>
+        </p:spPr>
+        <p:txBody>
+          <a:bodyPr wrap="none" rtlCol="0">
+            <a:spAutoFit/>
+          </a:bodyPr>
+          <a:lstStyle/>
+          <a:p>
+            <a:r>
+              <a:rPr lang="nl-NL" dirty="0"/>
+              <a:t>4000</a:t>
+            </a:r>
+          </a:p>
+        </p:txBody>
+      </p:sp>
+      <p:sp>
+        <p:nvSpPr>
+          <p:cNvPr id="2" name="Tekstvak 1">
+            <a:extLst>
+              <a:ext uri="{FF2B5EF4-FFF2-40B4-BE49-F238E27FC236}">
+                <a16:creationId xmlns:a16="http://schemas.microsoft.com/office/drawing/2014/main" id="{E72E5F14-6E12-EC4A-BC4A-E67038778B20}"/>
+              </a:ext>
+            </a:extLst>
+          </p:cNvPr>
+          <p:cNvSpPr txBox="1"/>
+          <p:nvPr/>
+        </p:nvSpPr>
+        <p:spPr>
+          <a:xfrm>
+            <a:off x="4219754" y="568873"/>
+            <a:ext cx="1444626" cy="369332"/>
+          </a:xfrm>
+          <a:prstGeom prst="rect">
+            <a:avLst/>
+          </a:prstGeom>
+          <a:noFill/>
+        </p:spPr>
+        <p:txBody>
+          <a:bodyPr wrap="none" rtlCol="0">
+            <a:spAutoFit/>
+          </a:bodyPr>
+          <a:lstStyle/>
+          <a:p>
+            <a:r>
+              <a:rPr lang="nl-NL" dirty="0"/>
+              <a:t>4000 4x5400</a:t>
+            </a:r>
+          </a:p>
+        </p:txBody>
+      </p:sp>
+      <p:sp>
+        <p:nvSpPr>
+          <p:cNvPr id="3" name="Tekstvak 2">
+            <a:extLst>
+              <a:ext uri="{FF2B5EF4-FFF2-40B4-BE49-F238E27FC236}">
+                <a16:creationId xmlns:a16="http://schemas.microsoft.com/office/drawing/2014/main" id="{DBBDF4A7-08DC-6813-CB72-198290388767}"/>
+              </a:ext>
+            </a:extLst>
+          </p:cNvPr>
+          <p:cNvSpPr txBox="1"/>
+          <p:nvPr/>
+        </p:nvSpPr>
+        <p:spPr>
+          <a:xfrm>
+            <a:off x="2380392" y="404689"/>
+            <a:ext cx="558166" cy="369332"/>
+          </a:xfrm>
+          <a:prstGeom prst="rect">
+            <a:avLst/>
+          </a:prstGeom>
+          <a:noFill/>
+        </p:spPr>
+        <p:txBody>
+          <a:bodyPr wrap="none" rtlCol="0">
+            <a:spAutoFit/>
+          </a:bodyPr>
+          <a:lstStyle/>
+          <a:p>
+            <a:r>
+              <a:rPr lang="nl-NL" dirty="0" err="1"/>
+              <a:t>grid</a:t>
+            </a:r>
+            <a:endParaRPr lang="nl-NL" dirty="0"/>
+          </a:p>
+        </p:txBody>
+      </p:sp>
+    </p:spTree>
+    <p:extLst>
+      <p:ext uri="{BB962C8B-B14F-4D97-AF65-F5344CB8AC3E}">
+        <p14:creationId xmlns:p14="http://schemas.microsoft.com/office/powerpoint/2010/main" val="1848385569"/>
       </p:ext>
     </p:extLst>
   </p:cSld>

</xml_diff>